<commit_message>
changed stuff for endpresentation
</commit_message>
<xml_diff>
--- a/Endpräsentation_Fahrrad&Bahn.pptx
+++ b/Endpräsentation_Fahrrad&Bahn.pptx
@@ -14,12 +14,12 @@
     <p:sldId id="256" r:id="rId2"/>
     <p:sldId id="257" r:id="rId3"/>
     <p:sldId id="258" r:id="rId4"/>
-    <p:sldId id="264" r:id="rId5"/>
-    <p:sldId id="263" r:id="rId6"/>
-    <p:sldId id="262" r:id="rId7"/>
-    <p:sldId id="267" r:id="rId8"/>
-    <p:sldId id="266" r:id="rId9"/>
-    <p:sldId id="268" r:id="rId10"/>
+    <p:sldId id="263" r:id="rId5"/>
+    <p:sldId id="262" r:id="rId6"/>
+    <p:sldId id="267" r:id="rId7"/>
+    <p:sldId id="266" r:id="rId8"/>
+    <p:sldId id="268" r:id="rId9"/>
+    <p:sldId id="269" r:id="rId10"/>
     <p:sldId id="265" r:id="rId11"/>
   </p:sldIdLst>
   <p:sldSz cx="10080625" cy="5670550"/>
@@ -119,6 +119,11 @@
       </a:defRPr>
     </a:lvl9pPr>
   </p:defaultTextStyle>
+  <p:extLst>
+    <p:ext uri="{EFAFB233-063F-42B5-8137-9DF3F51BA10A}">
+      <p15:sldGuideLst xmlns:p15="http://schemas.microsoft.com/office/powerpoint/2012/main"/>
+    </p:ext>
+  </p:extLst>
 </p:presentation>
 </file>
 
@@ -1375,7 +1380,7 @@
     </p:spTree>
     <p:extLst>
       <p:ext uri="{BB962C8B-B14F-4D97-AF65-F5344CB8AC3E}">
-        <p14:creationId xmlns:p14="http://schemas.microsoft.com/office/powerpoint/2010/main" val="2060204497"/>
+        <p14:creationId xmlns:p14="http://schemas.microsoft.com/office/powerpoint/2010/main" val="4134559947"/>
       </p:ext>
     </p:extLst>
   </p:cSld>
@@ -1407,7 +1412,7 @@
           <p:cNvPr id="7" name="Foliennummernplatzhalter 6">
             <a:extLst>
               <a:ext uri="{FF2B5EF4-FFF2-40B4-BE49-F238E27FC236}">
-                <a16:creationId xmlns:a16="http://schemas.microsoft.com/office/drawing/2014/main" id="{BBFADF65-67CA-E300-A36C-C4BC2DE61B4C}"/>
+                <a16:creationId xmlns:a16="http://schemas.microsoft.com/office/drawing/2014/main" id="{AC16108E-DA2B-C27E-762D-E1F8E7726D89}"/>
               </a:ext>
             </a:extLst>
           </p:cNvPr>
@@ -1428,7 +1433,7 @@
           <a:lstStyle/>
           <a:p>
             <a:pPr lvl="0"/>
-            <a:fld id="{25ACA8F8-C394-4AC2-B8CC-831EE9342D87}" type="slidenum">
+            <a:fld id="{7CCB2715-0F7B-42B3-B01B-0D912C77FCD2}" type="slidenum">
               <a:t>5</a:t>
             </a:fld>
             <a:endParaRPr lang="en-US"/>
@@ -1440,7 +1445,7 @@
           <p:cNvPr id="2" name="Folienbildplatzhalter 1">
             <a:extLst>
               <a:ext uri="{FF2B5EF4-FFF2-40B4-BE49-F238E27FC236}">
-                <a16:creationId xmlns:a16="http://schemas.microsoft.com/office/drawing/2014/main" id="{5DE4FAA9-0159-D8CA-6BB5-98E3AC099675}"/>
+                <a16:creationId xmlns:a16="http://schemas.microsoft.com/office/drawing/2014/main" id="{8B37FEB9-BCE0-8B44-D008-929BEEE7D995}"/>
               </a:ext>
             </a:extLst>
           </p:cNvPr>
@@ -1472,7 +1477,7 @@
           <p:cNvPr id="3" name="Notizenplatzhalter 2">
             <a:extLst>
               <a:ext uri="{FF2B5EF4-FFF2-40B4-BE49-F238E27FC236}">
-                <a16:creationId xmlns:a16="http://schemas.microsoft.com/office/drawing/2014/main" id="{B381B300-44E4-D643-2C8E-1230C2F97213}"/>
+                <a16:creationId xmlns:a16="http://schemas.microsoft.com/office/drawing/2014/main" id="{BAEAA13F-A8E1-F009-A9B6-1F484BB4BD8B}"/>
               </a:ext>
             </a:extLst>
           </p:cNvPr>
@@ -1488,14 +1493,26 @@
           <a:bodyPr vert="horz"/>
           <a:lstStyle/>
           <a:p>
-            <a:endParaRPr lang="en-US"/>
+            <a:r>
+              <a:rPr lang="de-DE" dirty="0"/>
+              <a:t>Was ist Opinion Mining/</a:t>
+            </a:r>
+            <a:r>
+              <a:rPr lang="de-DE" dirty="0" err="1"/>
+              <a:t>Sentimentanalyse</a:t>
+            </a:r>
+            <a:r>
+              <a:rPr lang="de-DE" dirty="0"/>
+              <a:t>: versucht, Meinungsäußerungen (Information) in Newsgroups und Foren (Sprachdaten) automatisch zu erkennen und zu klassifizieren und damit letztlich Wissen über Meinung zu extrahieren.</a:t>
+            </a:r>
+            <a:endParaRPr lang="en-US" dirty="0"/>
           </a:p>
         </p:txBody>
       </p:sp>
     </p:spTree>
     <p:extLst>
       <p:ext uri="{BB962C8B-B14F-4D97-AF65-F5344CB8AC3E}">
-        <p14:creationId xmlns:p14="http://schemas.microsoft.com/office/powerpoint/2010/main" val="4134559947"/>
+        <p14:creationId xmlns:p14="http://schemas.microsoft.com/office/powerpoint/2010/main" val="3214951688"/>
       </p:ext>
     </p:extLst>
   </p:cSld>
@@ -1608,18 +1625,6 @@
           <a:bodyPr vert="horz"/>
           <a:lstStyle/>
           <a:p>
-            <a:r>
-              <a:rPr lang="de-DE" dirty="0"/>
-              <a:t>Was ist Opinion Mining/</a:t>
-            </a:r>
-            <a:r>
-              <a:rPr lang="de-DE" dirty="0" err="1"/>
-              <a:t>Sentimentanalyse</a:t>
-            </a:r>
-            <a:r>
-              <a:rPr lang="de-DE" dirty="0"/>
-              <a:t>: versucht, Meinungsäußerungen (Information) in Newsgroups und Foren (Sprachdaten) automatisch zu erkennen und zu klassifizieren und damit letztlich Wissen über Meinung zu extrahieren.</a:t>
-            </a:r>
             <a:endParaRPr lang="en-US" dirty="0"/>
           </a:p>
         </p:txBody>
@@ -1627,7 +1632,7 @@
     </p:spTree>
     <p:extLst>
       <p:ext uri="{BB962C8B-B14F-4D97-AF65-F5344CB8AC3E}">
-        <p14:creationId xmlns:p14="http://schemas.microsoft.com/office/powerpoint/2010/main" val="3214951688"/>
+        <p14:creationId xmlns:p14="http://schemas.microsoft.com/office/powerpoint/2010/main" val="955886309"/>
       </p:ext>
     </p:extLst>
   </p:cSld>
@@ -1747,7 +1752,7 @@
     </p:spTree>
     <p:extLst>
       <p:ext uri="{BB962C8B-B14F-4D97-AF65-F5344CB8AC3E}">
-        <p14:creationId xmlns:p14="http://schemas.microsoft.com/office/powerpoint/2010/main" val="955886309"/>
+        <p14:creationId xmlns:p14="http://schemas.microsoft.com/office/powerpoint/2010/main" val="1703182994"/>
       </p:ext>
     </p:extLst>
   </p:cSld>
@@ -1860,6 +1865,38 @@
           <a:bodyPr vert="horz"/>
           <a:lstStyle/>
           <a:p>
+            <a:r>
+              <a:rPr lang="en-US" dirty="0"/>
+              <a:t>Elbow Method: den </a:t>
+            </a:r>
+            <a:r>
+              <a:rPr lang="en-US" dirty="0" err="1"/>
+              <a:t>Punkt</a:t>
+            </a:r>
+            <a:r>
+              <a:rPr lang="en-US" dirty="0"/>
+              <a:t> </a:t>
+            </a:r>
+            <a:r>
+              <a:rPr lang="en-US" dirty="0" err="1"/>
+              <a:t>auswählen</a:t>
+            </a:r>
+            <a:r>
+              <a:rPr lang="en-US" dirty="0"/>
+              <a:t>, ab dem die </a:t>
+            </a:r>
+            <a:r>
+              <a:rPr lang="en-US" dirty="0" err="1"/>
+              <a:t>Abflachung</a:t>
+            </a:r>
+            <a:r>
+              <a:rPr lang="en-US" dirty="0"/>
+              <a:t> linear </a:t>
+            </a:r>
+            <a:r>
+              <a:rPr lang="en-US" dirty="0" err="1"/>
+              <a:t>wird</a:t>
+            </a:r>
             <a:endParaRPr lang="en-US" dirty="0"/>
           </a:p>
         </p:txBody>
@@ -1867,7 +1904,7 @@
     </p:spTree>
     <p:extLst>
       <p:ext uri="{BB962C8B-B14F-4D97-AF65-F5344CB8AC3E}">
-        <p14:creationId xmlns:p14="http://schemas.microsoft.com/office/powerpoint/2010/main" val="1703182994"/>
+        <p14:creationId xmlns:p14="http://schemas.microsoft.com/office/powerpoint/2010/main" val="1304047299"/>
       </p:ext>
     </p:extLst>
   </p:cSld>
@@ -1981,36 +2018,16 @@
           <a:lstStyle/>
           <a:p>
             <a:r>
-              <a:rPr lang="en-US" dirty="0"/>
-              <a:t>Elbow Method: den </a:t>
-            </a:r>
-            <a:r>
-              <a:rPr lang="en-US" dirty="0" err="1"/>
-              <a:t>Punkt</a:t>
-            </a:r>
-            <a:r>
-              <a:rPr lang="en-US" dirty="0"/>
-              <a:t> </a:t>
-            </a:r>
-            <a:r>
-              <a:rPr lang="en-US" dirty="0" err="1"/>
-              <a:t>auswählen</a:t>
-            </a:r>
-            <a:r>
-              <a:rPr lang="en-US" dirty="0"/>
-              <a:t>, ab dem die </a:t>
-            </a:r>
-            <a:r>
-              <a:rPr lang="en-US" dirty="0" err="1"/>
-              <a:t>Abflachung</a:t>
-            </a:r>
-            <a:r>
-              <a:rPr lang="en-US" dirty="0"/>
-              <a:t> linear </a:t>
-            </a:r>
-            <a:r>
-              <a:rPr lang="en-US" dirty="0" err="1"/>
-              <a:t>wird</a:t>
+              <a:rPr lang="de-DE" dirty="0"/>
+              <a:t>Was ist Opinion Mining/</a:t>
+            </a:r>
+            <a:r>
+              <a:rPr lang="de-DE" dirty="0" err="1"/>
+              <a:t>Sentimentanalyse</a:t>
+            </a:r>
+            <a:r>
+              <a:rPr lang="de-DE" dirty="0"/>
+              <a:t>: versucht, Meinungsäußerungen (Information) in Newsgroups und Foren (Sprachdaten) automatisch zu erkennen und zu klassifizieren und damit letztlich Wissen über Meinung zu extrahieren.</a:t>
             </a:r>
             <a:endParaRPr lang="en-US" dirty="0"/>
           </a:p>
@@ -2019,7 +2036,7 @@
     </p:spTree>
     <p:extLst>
       <p:ext uri="{BB962C8B-B14F-4D97-AF65-F5344CB8AC3E}">
-        <p14:creationId xmlns:p14="http://schemas.microsoft.com/office/powerpoint/2010/main" val="1304047299"/>
+        <p14:creationId xmlns:p14="http://schemas.microsoft.com/office/powerpoint/2010/main" val="1322213660"/>
       </p:ext>
     </p:extLst>
   </p:cSld>
@@ -5285,7 +5302,7 @@
       </p:grpSpPr>
       <p:pic>
         <p:nvPicPr>
-          <p:cNvPr id="2" name="">
+          <p:cNvPr id="2" name="Grafik 1">
             <a:extLst>
               <a:ext uri="{FF2B5EF4-FFF2-40B4-BE49-F238E27FC236}">
                 <a16:creationId xmlns:a16="http://schemas.microsoft.com/office/drawing/2014/main" id="{129F043C-6404-8E30-A1AF-7B5DC5668018}"/>
@@ -5720,7 +5737,7 @@
         <p:spPr/>
         <p:txBody>
           <a:bodyPr vert="horz">
-            <a:normAutofit fontScale="77500" lnSpcReduction="20000"/>
+            <a:normAutofit fontScale="62500" lnSpcReduction="20000"/>
           </a:bodyPr>
           <a:lstStyle/>
           <a:p>
@@ -5812,6 +5829,25 @@
                 <a:hlinkClick r:id="rId4"/>
               </a:rPr>
               <a:t>https://www.geeksforgeeks.org/elbow-method-for-optimal-value-of-k-in-kmeans/</a:t>
+            </a:r>
+            <a:r>
+              <a:rPr lang="en-US" dirty="0"/>
+              <a:t> (24.07.2022)</a:t>
+            </a:r>
+          </a:p>
+          <a:p>
+            <a:pPr lvl="0">
+              <a:buSzPct val="45000"/>
+            </a:pPr>
+            <a:r>
+              <a:rPr lang="en-US" dirty="0"/>
+              <a:t>4: Developer Platform. Getting started. Twitter platform. Online: </a:t>
+            </a:r>
+            <a:r>
+              <a:rPr lang="en-US" dirty="0">
+                <a:hlinkClick r:id="rId5"/>
+              </a:rPr>
+              <a:t>https://developer.twitter.com/en/docs/twitter-api/getting-started/about-twitter-api</a:t>
             </a:r>
             <a:r>
               <a:rPr lang="en-US" dirty="0"/>
@@ -5918,7 +5954,7 @@
       </p:grpSpPr>
       <p:pic>
         <p:nvPicPr>
-          <p:cNvPr id="2" name="">
+          <p:cNvPr id="2" name="Grafik 1">
             <a:extLst>
               <a:ext uri="{FF2B5EF4-FFF2-40B4-BE49-F238E27FC236}">
                 <a16:creationId xmlns:a16="http://schemas.microsoft.com/office/drawing/2014/main" id="{8CBD471B-197A-9CA6-6800-C59C2AB503EB}"/>
@@ -6367,7 +6403,7 @@
       </p:grpSpPr>
       <p:pic>
         <p:nvPicPr>
-          <p:cNvPr id="2" name="">
+          <p:cNvPr id="2" name="Grafik 1">
             <a:extLst>
               <a:ext uri="{FF2B5EF4-FFF2-40B4-BE49-F238E27FC236}">
                 <a16:creationId xmlns:a16="http://schemas.microsoft.com/office/drawing/2014/main" id="{3C79F0FD-64A8-5EEB-2A91-CC6B05E86179}"/>
@@ -6615,7 +6651,7 @@
         </p:blipFill>
         <p:spPr>
           <a:xfrm>
-            <a:off x="6499041" y="1247552"/>
+            <a:off x="6779597" y="1172520"/>
             <a:ext cx="2796042" cy="3920456"/>
           </a:xfrm>
           <a:prstGeom prst="rect">
@@ -6645,10 +6681,43 @@
           <a:lstStyle/>
           <a:p>
             <a:pPr lvl="0"/>
-            <a:endParaRPr lang="en-US" dirty="0"/>
-          </a:p>
-        </p:txBody>
-      </p:sp>
+            <a:r>
+              <a:rPr lang="en-US" dirty="0"/>
+              <a:t>Quelle: 4</a:t>
+            </a:r>
+          </a:p>
+        </p:txBody>
+      </p:sp>
+      <p:pic>
+        <p:nvPicPr>
+          <p:cNvPr id="8" name="Grafik 7">
+            <a:extLst>
+              <a:ext uri="{FF2B5EF4-FFF2-40B4-BE49-F238E27FC236}">
+                <a16:creationId xmlns:a16="http://schemas.microsoft.com/office/drawing/2014/main" id="{C43A0311-6B4E-942D-4911-557385A8A331}"/>
+              </a:ext>
+            </a:extLst>
+          </p:cNvPr>
+          <p:cNvPicPr>
+            <a:picLocks noChangeAspect="1"/>
+          </p:cNvPicPr>
+          <p:nvPr/>
+        </p:nvPicPr>
+        <p:blipFill>
+          <a:blip r:embed="rId5"/>
+          <a:stretch>
+            <a:fillRect/>
+          </a:stretch>
+        </p:blipFill>
+        <p:spPr>
+          <a:xfrm>
+            <a:off x="5988058" y="3869887"/>
+            <a:ext cx="2227681" cy="1524593"/>
+          </a:xfrm>
+          <a:prstGeom prst="rect">
+            <a:avLst/>
+          </a:prstGeom>
+        </p:spPr>
+      </p:pic>
     </p:spTree>
   </p:cSld>
   <p:clrMapOvr>
@@ -6735,16 +6804,12 @@
           <a:p>
             <a:pPr lvl="0"/>
             <a:r>
+              <a:rPr lang="en-US" dirty="0" err="1"/>
+              <a:t>Kontext</a:t>
+            </a:r>
+            <a:r>
               <a:rPr lang="en-US" dirty="0"/>
-              <a:t>Das </a:t>
-            </a:r>
-            <a:r>
-              <a:rPr lang="en-US" dirty="0" err="1"/>
-              <a:t>Datenset</a:t>
-            </a:r>
-            <a:r>
-              <a:rPr lang="en-US" dirty="0"/>
-              <a:t> </a:t>
+              <a:t> 9€ Ticket</a:t>
             </a:r>
           </a:p>
         </p:txBody>
@@ -6809,40 +6874,10 @@
       </p:sp>
       <p:pic>
         <p:nvPicPr>
-          <p:cNvPr id="9" name="Grafik 8">
-            <a:extLst>
-              <a:ext uri="{FF2B5EF4-FFF2-40B4-BE49-F238E27FC236}">
-                <a16:creationId xmlns:a16="http://schemas.microsoft.com/office/drawing/2014/main" id="{8E94CC19-AA75-CDCE-05DA-ADBEE79B1EA3}"/>
-              </a:ext>
-            </a:extLst>
-          </p:cNvPr>
-          <p:cNvPicPr>
-            <a:picLocks noChangeAspect="1"/>
-          </p:cNvPicPr>
-          <p:nvPr/>
-        </p:nvPicPr>
-        <p:blipFill>
-          <a:blip r:embed="rId4"/>
-          <a:stretch>
-            <a:fillRect/>
-          </a:stretch>
-        </p:blipFill>
-        <p:spPr>
-          <a:xfrm>
-            <a:off x="764576" y="1172520"/>
-            <a:ext cx="2796042" cy="3920456"/>
-          </a:xfrm>
-          <a:prstGeom prst="rect">
-            <a:avLst/>
-          </a:prstGeom>
-        </p:spPr>
-      </p:pic>
-      <p:pic>
-        <p:nvPicPr>
-          <p:cNvPr id="7" name="Picture 4">
-            <a:extLst>
-              <a:ext uri="{FF2B5EF4-FFF2-40B4-BE49-F238E27FC236}">
-                <a16:creationId xmlns:a16="http://schemas.microsoft.com/office/drawing/2014/main" id="{4C71481E-CD4D-0A06-AF8C-1C48EB8B4F98}"/>
+          <p:cNvPr id="1032" name="Picture 8">
+            <a:extLst>
+              <a:ext uri="{FF2B5EF4-FFF2-40B4-BE49-F238E27FC236}">
+                <a16:creationId xmlns:a16="http://schemas.microsoft.com/office/drawing/2014/main" id="{3394C7AC-1AB1-89E0-9CDF-D1C296AD32F1}"/>
               </a:ext>
             </a:extLst>
           </p:cNvPr>
@@ -6852,7 +6887,7 @@
           <p:nvPr/>
         </p:nvPicPr>
         <p:blipFill>
-          <a:blip r:embed="rId5">
+          <a:blip r:embed="rId4">
             <a:extLst>
               <a:ext uri="{28A0092B-C50C-407E-A947-70E740481C1C}">
                 <a14:useLocalDpi xmlns:a14="http://schemas.microsoft.com/office/drawing/2010/main" val="0"/>
@@ -6866,8 +6901,8 @@
         </p:blipFill>
         <p:spPr bwMode="auto">
           <a:xfrm>
-            <a:off x="5323758" y="3242804"/>
-            <a:ext cx="3117440" cy="1616782"/>
+            <a:off x="1270522" y="1756435"/>
+            <a:ext cx="3448251" cy="2875059"/>
           </a:xfrm>
           <a:prstGeom prst="rect">
             <a:avLst/>
@@ -6886,40 +6921,57 @@
       </p:pic>
       <p:pic>
         <p:nvPicPr>
-          <p:cNvPr id="8" name="Grafik 7">
-            <a:extLst>
-              <a:ext uri="{FF2B5EF4-FFF2-40B4-BE49-F238E27FC236}">
-                <a16:creationId xmlns:a16="http://schemas.microsoft.com/office/drawing/2014/main" id="{A10258B6-7EF4-C2FD-CE16-C2883D454201}"/>
+          <p:cNvPr id="1034" name="Picture 10">
+            <a:extLst>
+              <a:ext uri="{FF2B5EF4-FFF2-40B4-BE49-F238E27FC236}">
+                <a16:creationId xmlns:a16="http://schemas.microsoft.com/office/drawing/2014/main" id="{A387C80F-D25D-2F71-CFBD-AA39D74782BA}"/>
               </a:ext>
             </a:extLst>
           </p:cNvPr>
           <p:cNvPicPr>
-            <a:picLocks noChangeAspect="1"/>
+            <a:picLocks noChangeAspect="1" noChangeArrowheads="1"/>
           </p:cNvPicPr>
           <p:nvPr/>
         </p:nvPicPr>
         <p:blipFill>
-          <a:blip r:embed="rId6"/>
+          <a:blip r:embed="rId5">
+            <a:extLst>
+              <a:ext uri="{28A0092B-C50C-407E-A947-70E740481C1C}">
+                <a14:useLocalDpi xmlns:a14="http://schemas.microsoft.com/office/drawing/2010/main" val="0"/>
+              </a:ext>
+            </a:extLst>
+          </a:blip>
+          <a:srcRect/>
           <a:stretch>
             <a:fillRect/>
           </a:stretch>
         </p:blipFill>
-        <p:spPr>
+        <p:spPr bwMode="auto">
           <a:xfrm>
-            <a:off x="3986879" y="1218355"/>
-            <a:ext cx="2361920" cy="1616464"/>
+            <a:off x="5242063" y="1751284"/>
+            <a:ext cx="3381512" cy="2880210"/>
           </a:xfrm>
           <a:prstGeom prst="rect">
             <a:avLst/>
           </a:prstGeom>
+          <a:noFill/>
+          <a:extLst>
+            <a:ext uri="{909E8E84-426E-40DD-AFC4-6F175D3DCCD1}">
+              <a14:hiddenFill xmlns:a14="http://schemas.microsoft.com/office/drawing/2010/main">
+                <a:solidFill>
+                  <a:srgbClr val="FFFFFF"/>
+                </a:solidFill>
+              </a14:hiddenFill>
+            </a:ext>
+          </a:extLst>
         </p:spPr>
       </p:pic>
       <p:sp>
         <p:nvSpPr>
-          <p:cNvPr id="6" name="Fußzeilenplatzhalter 5">
-            <a:extLst>
-              <a:ext uri="{FF2B5EF4-FFF2-40B4-BE49-F238E27FC236}">
-                <a16:creationId xmlns:a16="http://schemas.microsoft.com/office/drawing/2014/main" id="{22D5FAEF-6629-3CC4-4F7E-4459A569BFF1}"/>
+          <p:cNvPr id="8" name="Fußzeilenplatzhalter 7">
+            <a:extLst>
+              <a:ext uri="{FF2B5EF4-FFF2-40B4-BE49-F238E27FC236}">
+                <a16:creationId xmlns:a16="http://schemas.microsoft.com/office/drawing/2014/main" id="{DC6A6906-5E76-F7FB-CAE5-011161E09BC4}"/>
               </a:ext>
             </a:extLst>
           </p:cNvPr>
@@ -6943,7 +6995,7 @@
     </p:spTree>
     <p:extLst>
       <p:ext uri="{BB962C8B-B14F-4D97-AF65-F5344CB8AC3E}">
-        <p14:creationId xmlns:p14="http://schemas.microsoft.com/office/powerpoint/2010/main" val="273167317"/>
+        <p14:creationId xmlns:p14="http://schemas.microsoft.com/office/powerpoint/2010/main" val="4261193989"/>
       </p:ext>
     </p:extLst>
   </p:cSld>
@@ -6972,10 +7024,10 @@
       </p:grpSpPr>
       <p:pic>
         <p:nvPicPr>
-          <p:cNvPr id="2" name="">
-            <a:extLst>
-              <a:ext uri="{FF2B5EF4-FFF2-40B4-BE49-F238E27FC236}">
-                <a16:creationId xmlns:a16="http://schemas.microsoft.com/office/drawing/2014/main" id="{3C79F0FD-64A8-5EEB-2A91-CC6B05E86179}"/>
+          <p:cNvPr id="2" name="Grafik 1">
+            <a:extLst>
+              <a:ext uri="{FF2B5EF4-FFF2-40B4-BE49-F238E27FC236}">
+                <a16:creationId xmlns:a16="http://schemas.microsoft.com/office/drawing/2014/main" id="{8CBD471B-197A-9CA6-6800-C59C2AB503EB}"/>
               </a:ext>
             </a:extLst>
           </p:cNvPr>
@@ -7013,7 +7065,7 @@
           <p:cNvPr id="3" name="Titel 2">
             <a:extLst>
               <a:ext uri="{FF2B5EF4-FFF2-40B4-BE49-F238E27FC236}">
-                <a16:creationId xmlns:a16="http://schemas.microsoft.com/office/drawing/2014/main" id="{F7EF279D-64F4-211F-F3F0-49D59CFC748F}"/>
+                <a16:creationId xmlns:a16="http://schemas.microsoft.com/office/drawing/2014/main" id="{5F129FD0-72FC-E004-53A8-F9619362310F}"/>
               </a:ext>
             </a:extLst>
           </p:cNvPr>
@@ -7024,7 +7076,12 @@
             <p:ph type="title" idx="4294967295"/>
           </p:nvPr>
         </p:nvSpPr>
-        <p:spPr/>
+        <p:spPr>
+          <a:xfrm>
+            <a:off x="503999" y="273240"/>
+            <a:ext cx="9071640" cy="946440"/>
+          </a:xfrm>
+        </p:spPr>
         <p:txBody>
           <a:bodyPr vert="horz"/>
           <a:lstStyle/>
@@ -7032,12 +7089,176 @@
             <a:pPr lvl="0"/>
             <a:r>
               <a:rPr lang="en-US" dirty="0" err="1"/>
-              <a:t>Kontext</a:t>
-            </a:r>
+              <a:t>Sentimentanalyse</a:t>
+            </a:r>
+            <a:endParaRPr lang="en-US" dirty="0"/>
+          </a:p>
+        </p:txBody>
+      </p:sp>
+      <p:sp>
+        <p:nvSpPr>
+          <p:cNvPr id="4" name="Textplatzhalter 3">
+            <a:extLst>
+              <a:ext uri="{FF2B5EF4-FFF2-40B4-BE49-F238E27FC236}">
+                <a16:creationId xmlns:a16="http://schemas.microsoft.com/office/drawing/2014/main" id="{BE7B3F62-582B-123D-2ECE-29BF697C0566}"/>
+              </a:ext>
+            </a:extLst>
+          </p:cNvPr>
+          <p:cNvSpPr txBox="1">
+            <a:spLocks noGrp="1"/>
+          </p:cNvSpPr>
+          <p:nvPr>
+            <p:ph type="body" idx="4294967295"/>
+          </p:nvPr>
+        </p:nvSpPr>
+        <p:spPr>
+          <a:xfrm>
+            <a:off x="503998" y="1326600"/>
+            <a:ext cx="9554401" cy="3288239"/>
+          </a:xfrm>
+        </p:spPr>
+        <p:txBody>
+          <a:bodyPr vert="horz"/>
+          <a:lstStyle/>
+          <a:p>
+            <a:pPr lvl="0">
+              <a:buSzPct val="45000"/>
+              <a:buFont typeface="StarSymbol"/>
+              <a:buChar char="●"/>
+            </a:pPr>
             <a:r>
               <a:rPr lang="en-US" dirty="0"/>
-              <a:t> 9€ Ticket</a:t>
-            </a:r>
+              <a:t>Modell: </a:t>
+            </a:r>
+          </a:p>
+          <a:p>
+            <a:pPr lvl="1">
+              <a:buSzPct val="45000"/>
+              <a:buFont typeface="StarSymbol"/>
+              <a:buChar char="●"/>
+            </a:pPr>
+            <a:r>
+              <a:rPr lang="en-US" dirty="0"/>
+              <a:t>German Sentiment Classification with Bert </a:t>
+            </a:r>
+          </a:p>
+          <a:p>
+            <a:pPr lvl="1">
+              <a:buSzPct val="45000"/>
+              <a:buFont typeface="StarSymbol"/>
+              <a:buChar char="●"/>
+            </a:pPr>
+            <a:r>
+              <a:rPr lang="de-DE" dirty="0"/>
+              <a:t>Nutzt</a:t>
+            </a:r>
+            <a:r>
+              <a:rPr lang="en-US" dirty="0"/>
+              <a:t> die Google Bert </a:t>
+            </a:r>
+            <a:r>
+              <a:rPr lang="en-US" dirty="0" err="1"/>
+              <a:t>Architektur</a:t>
+            </a:r>
+            <a:endParaRPr lang="en-US" dirty="0"/>
+          </a:p>
+          <a:p>
+            <a:pPr lvl="1">
+              <a:buSzPct val="45000"/>
+              <a:buFont typeface="StarSymbol"/>
+              <a:buChar char="●"/>
+            </a:pPr>
+            <a:r>
+              <a:rPr lang="en-US" dirty="0" err="1"/>
+              <a:t>Trainiert</a:t>
+            </a:r>
+            <a:r>
+              <a:rPr lang="en-US" dirty="0"/>
+              <a:t> auf 1.834 Mio </a:t>
+            </a:r>
+            <a:r>
+              <a:rPr lang="en-US" dirty="0" err="1"/>
+              <a:t>deutschsprachigen</a:t>
+            </a:r>
+            <a:r>
+              <a:rPr lang="en-US" dirty="0"/>
+              <a:t> </a:t>
+            </a:r>
+            <a:r>
+              <a:rPr lang="en-US" dirty="0" err="1"/>
+              <a:t>Beispieltexten</a:t>
+            </a:r>
+            <a:endParaRPr lang="en-US" dirty="0"/>
+          </a:p>
+          <a:p>
+            <a:pPr lvl="1">
+              <a:buSzPct val="45000"/>
+              <a:buFont typeface="StarSymbol"/>
+              <a:buChar char="●"/>
+            </a:pPr>
+            <a:r>
+              <a:rPr lang="en-US" dirty="0"/>
+              <a:t>In </a:t>
+            </a:r>
+            <a:r>
+              <a:rPr lang="en-US" dirty="0" err="1"/>
+              <a:t>einem</a:t>
+            </a:r>
+            <a:r>
+              <a:rPr lang="en-US" dirty="0"/>
+              <a:t> Python-Package </a:t>
+            </a:r>
+            <a:r>
+              <a:rPr lang="en-US" dirty="0" err="1"/>
+              <a:t>gebündelter</a:t>
+            </a:r>
+            <a:r>
+              <a:rPr lang="en-US" dirty="0"/>
+              <a:t> Code</a:t>
+            </a:r>
+          </a:p>
+          <a:p>
+            <a:pPr lvl="1">
+              <a:buSzPct val="45000"/>
+              <a:buFont typeface="StarSymbol"/>
+              <a:buChar char="●"/>
+            </a:pPr>
+            <a:r>
+              <a:rPr lang="en-US" dirty="0"/>
+              <a:t>MIT License (</a:t>
+            </a:r>
+            <a:r>
+              <a:rPr lang="en-US" dirty="0" err="1"/>
+              <a:t>Erhaltung</a:t>
+            </a:r>
+            <a:r>
+              <a:rPr lang="en-US" dirty="0"/>
+              <a:t> von </a:t>
+            </a:r>
+            <a:r>
+              <a:rPr lang="en-US" dirty="0" err="1"/>
+              <a:t>Urheberrechts</a:t>
+            </a:r>
+            <a:r>
+              <a:rPr lang="en-US" dirty="0"/>
+              <a:t>- und </a:t>
+            </a:r>
+            <a:r>
+              <a:rPr lang="en-US" dirty="0" err="1"/>
+              <a:t>Lizenzvermerken</a:t>
+            </a:r>
+            <a:r>
+              <a:rPr lang="en-US" dirty="0"/>
+              <a:t>)</a:t>
+            </a:r>
+          </a:p>
+          <a:p>
+            <a:pPr lvl="1">
+              <a:buSzPct val="45000"/>
+              <a:buFont typeface="StarSymbol"/>
+              <a:buChar char="●"/>
+            </a:pPr>
+            <a:endParaRPr lang="en-US" dirty="0"/>
           </a:p>
         </p:txBody>
       </p:sp>
@@ -7046,7 +7267,7 @@
           <p:cNvPr id="5" name="Textfeld 4">
             <a:extLst>
               <a:ext uri="{FF2B5EF4-FFF2-40B4-BE49-F238E27FC236}">
-                <a16:creationId xmlns:a16="http://schemas.microsoft.com/office/drawing/2014/main" id="{A5295C83-55CF-C4BA-84B7-0DDA1ED208C7}"/>
+                <a16:creationId xmlns:a16="http://schemas.microsoft.com/office/drawing/2014/main" id="{9D7303CD-763D-2A38-08C3-DB08FCC19A37}"/>
               </a:ext>
             </a:extLst>
           </p:cNvPr>
@@ -7085,7 +7306,7 @@
               <a:buNone/>
               <a:tabLst/>
             </a:pPr>
-            <a:fld id="{ABEBA7EF-5774-4DDD-B883-500657EE155F}" type="slidenum">
+            <a:fld id="{91CD7B40-FCA9-49D6-9B53-7164D24F73CB}" type="slidenum">
               <a:t>5</a:t>
             </a:fld>
             <a:endParaRPr lang="en-US" sz="900" b="0" i="0" u="none" strike="noStrike" kern="1200" cap="none">
@@ -7099,106 +7320,12 @@
           </a:p>
         </p:txBody>
       </p:sp>
-      <p:pic>
-        <p:nvPicPr>
-          <p:cNvPr id="1032" name="Picture 8">
-            <a:extLst>
-              <a:ext uri="{FF2B5EF4-FFF2-40B4-BE49-F238E27FC236}">
-                <a16:creationId xmlns:a16="http://schemas.microsoft.com/office/drawing/2014/main" id="{3394C7AC-1AB1-89E0-9CDF-D1C296AD32F1}"/>
-              </a:ext>
-            </a:extLst>
-          </p:cNvPr>
-          <p:cNvPicPr>
-            <a:picLocks noChangeAspect="1" noChangeArrowheads="1"/>
-          </p:cNvPicPr>
-          <p:nvPr/>
-        </p:nvPicPr>
-        <p:blipFill>
-          <a:blip r:embed="rId4">
-            <a:extLst>
-              <a:ext uri="{28A0092B-C50C-407E-A947-70E740481C1C}">
-                <a14:useLocalDpi xmlns:a14="http://schemas.microsoft.com/office/drawing/2010/main" val="0"/>
-              </a:ext>
-            </a:extLst>
-          </a:blip>
-          <a:srcRect/>
-          <a:stretch>
-            <a:fillRect/>
-          </a:stretch>
-        </p:blipFill>
-        <p:spPr bwMode="auto">
-          <a:xfrm>
-            <a:off x="1270522" y="1756435"/>
-            <a:ext cx="3448251" cy="2875059"/>
-          </a:xfrm>
-          <a:prstGeom prst="rect">
-            <a:avLst/>
-          </a:prstGeom>
-          <a:noFill/>
-          <a:extLst>
-            <a:ext uri="{909E8E84-426E-40DD-AFC4-6F175D3DCCD1}">
-              <a14:hiddenFill xmlns:a14="http://schemas.microsoft.com/office/drawing/2010/main">
-                <a:solidFill>
-                  <a:srgbClr val="FFFFFF"/>
-                </a:solidFill>
-              </a14:hiddenFill>
-            </a:ext>
-          </a:extLst>
-        </p:spPr>
-      </p:pic>
-      <p:pic>
-        <p:nvPicPr>
-          <p:cNvPr id="1034" name="Picture 10">
-            <a:extLst>
-              <a:ext uri="{FF2B5EF4-FFF2-40B4-BE49-F238E27FC236}">
-                <a16:creationId xmlns:a16="http://schemas.microsoft.com/office/drawing/2014/main" id="{A387C80F-D25D-2F71-CFBD-AA39D74782BA}"/>
-              </a:ext>
-            </a:extLst>
-          </p:cNvPr>
-          <p:cNvPicPr>
-            <a:picLocks noChangeAspect="1" noChangeArrowheads="1"/>
-          </p:cNvPicPr>
-          <p:nvPr/>
-        </p:nvPicPr>
-        <p:blipFill>
-          <a:blip r:embed="rId5">
-            <a:extLst>
-              <a:ext uri="{28A0092B-C50C-407E-A947-70E740481C1C}">
-                <a14:useLocalDpi xmlns:a14="http://schemas.microsoft.com/office/drawing/2010/main" val="0"/>
-              </a:ext>
-            </a:extLst>
-          </a:blip>
-          <a:srcRect/>
-          <a:stretch>
-            <a:fillRect/>
-          </a:stretch>
-        </p:blipFill>
-        <p:spPr bwMode="auto">
-          <a:xfrm>
-            <a:off x="5242063" y="1751284"/>
-            <a:ext cx="3381512" cy="2880210"/>
-          </a:xfrm>
-          <a:prstGeom prst="rect">
-            <a:avLst/>
-          </a:prstGeom>
-          <a:noFill/>
-          <a:extLst>
-            <a:ext uri="{909E8E84-426E-40DD-AFC4-6F175D3DCCD1}">
-              <a14:hiddenFill xmlns:a14="http://schemas.microsoft.com/office/drawing/2010/main">
-                <a:solidFill>
-                  <a:srgbClr val="FFFFFF"/>
-                </a:solidFill>
-              </a14:hiddenFill>
-            </a:ext>
-          </a:extLst>
-        </p:spPr>
-      </p:pic>
-      <p:sp>
-        <p:nvSpPr>
-          <p:cNvPr id="8" name="Fußzeilenplatzhalter 7">
-            <a:extLst>
-              <a:ext uri="{FF2B5EF4-FFF2-40B4-BE49-F238E27FC236}">
-                <a16:creationId xmlns:a16="http://schemas.microsoft.com/office/drawing/2014/main" id="{DC6A6906-5E76-F7FB-CAE5-011161E09BC4}"/>
+      <p:sp>
+        <p:nvSpPr>
+          <p:cNvPr id="10" name="Fußzeilenplatzhalter 9">
+            <a:extLst>
+              <a:ext uri="{FF2B5EF4-FFF2-40B4-BE49-F238E27FC236}">
+                <a16:creationId xmlns:a16="http://schemas.microsoft.com/office/drawing/2014/main" id="{18500E83-202F-175B-FFC5-5DB0F295C0DA}"/>
               </a:ext>
             </a:extLst>
           </p:cNvPr>
@@ -7215,14 +7342,17 @@
           <a:lstStyle/>
           <a:p>
             <a:pPr lvl="0"/>
-            <a:endParaRPr lang="en-US" dirty="0"/>
+            <a:r>
+              <a:rPr lang="en-US" dirty="0"/>
+              <a:t>Quelle: 1, 2</a:t>
+            </a:r>
           </a:p>
         </p:txBody>
       </p:sp>
     </p:spTree>
     <p:extLst>
       <p:ext uri="{BB962C8B-B14F-4D97-AF65-F5344CB8AC3E}">
-        <p14:creationId xmlns:p14="http://schemas.microsoft.com/office/powerpoint/2010/main" val="4261193989"/>
+        <p14:creationId xmlns:p14="http://schemas.microsoft.com/office/powerpoint/2010/main" val="3729865801"/>
       </p:ext>
     </p:extLst>
   </p:cSld>
@@ -7251,7 +7381,7 @@
       </p:grpSpPr>
       <p:pic>
         <p:nvPicPr>
-          <p:cNvPr id="2" name="">
+          <p:cNvPr id="2" name="Grafik 1">
             <a:extLst>
               <a:ext uri="{FF2B5EF4-FFF2-40B4-BE49-F238E27FC236}">
                 <a16:creationId xmlns:a16="http://schemas.microsoft.com/office/drawing/2014/main" id="{8CBD471B-197A-9CA6-6800-C59C2AB503EB}"/>
@@ -7324,173 +7454,6 @@
       </p:sp>
       <p:sp>
         <p:nvSpPr>
-          <p:cNvPr id="4" name="Textplatzhalter 3">
-            <a:extLst>
-              <a:ext uri="{FF2B5EF4-FFF2-40B4-BE49-F238E27FC236}">
-                <a16:creationId xmlns:a16="http://schemas.microsoft.com/office/drawing/2014/main" id="{BE7B3F62-582B-123D-2ECE-29BF697C0566}"/>
-              </a:ext>
-            </a:extLst>
-          </p:cNvPr>
-          <p:cNvSpPr txBox="1">
-            <a:spLocks noGrp="1"/>
-          </p:cNvSpPr>
-          <p:nvPr>
-            <p:ph type="body" idx="4294967295"/>
-          </p:nvPr>
-        </p:nvSpPr>
-        <p:spPr>
-          <a:xfrm>
-            <a:off x="503998" y="1326600"/>
-            <a:ext cx="9554401" cy="3288239"/>
-          </a:xfrm>
-        </p:spPr>
-        <p:txBody>
-          <a:bodyPr vert="horz"/>
-          <a:lstStyle/>
-          <a:p>
-            <a:pPr lvl="0">
-              <a:buSzPct val="45000"/>
-              <a:buFont typeface="StarSymbol"/>
-              <a:buChar char="●"/>
-            </a:pPr>
-            <a:r>
-              <a:rPr lang="en-US" dirty="0"/>
-              <a:t>Modell: </a:t>
-            </a:r>
-          </a:p>
-          <a:p>
-            <a:pPr lvl="1">
-              <a:buSzPct val="45000"/>
-              <a:buFont typeface="StarSymbol"/>
-              <a:buChar char="●"/>
-            </a:pPr>
-            <a:r>
-              <a:rPr lang="en-US" dirty="0"/>
-              <a:t>German Sentiment Classification with Bert </a:t>
-            </a:r>
-          </a:p>
-          <a:p>
-            <a:pPr lvl="1">
-              <a:buSzPct val="45000"/>
-              <a:buFont typeface="StarSymbol"/>
-              <a:buChar char="●"/>
-            </a:pPr>
-            <a:r>
-              <a:rPr lang="de-DE" dirty="0"/>
-              <a:t>Nutzt</a:t>
-            </a:r>
-            <a:r>
-              <a:rPr lang="en-US" dirty="0"/>
-              <a:t> die Google Bert </a:t>
-            </a:r>
-            <a:r>
-              <a:rPr lang="en-US" dirty="0" err="1"/>
-              <a:t>Architektur</a:t>
-            </a:r>
-            <a:endParaRPr lang="en-US" dirty="0"/>
-          </a:p>
-          <a:p>
-            <a:pPr lvl="1">
-              <a:buSzPct val="45000"/>
-              <a:buFont typeface="StarSymbol"/>
-              <a:buChar char="●"/>
-            </a:pPr>
-            <a:r>
-              <a:rPr lang="en-US" dirty="0" err="1"/>
-              <a:t>Trainiert</a:t>
-            </a:r>
-            <a:r>
-              <a:rPr lang="en-US" dirty="0"/>
-              <a:t> auf 1.834 Mio </a:t>
-            </a:r>
-            <a:r>
-              <a:rPr lang="en-US" dirty="0" err="1"/>
-              <a:t>deutschsprachigen</a:t>
-            </a:r>
-            <a:r>
-              <a:rPr lang="en-US" dirty="0"/>
-              <a:t> </a:t>
-            </a:r>
-            <a:r>
-              <a:rPr lang="en-US" dirty="0" err="1"/>
-              <a:t>Beispieltexten</a:t>
-            </a:r>
-            <a:endParaRPr lang="en-US" dirty="0"/>
-          </a:p>
-          <a:p>
-            <a:pPr lvl="1">
-              <a:buSzPct val="45000"/>
-              <a:buFont typeface="StarSymbol"/>
-              <a:buChar char="●"/>
-            </a:pPr>
-            <a:r>
-              <a:rPr lang="en-US" dirty="0"/>
-              <a:t>In </a:t>
-            </a:r>
-            <a:r>
-              <a:rPr lang="en-US" dirty="0" err="1"/>
-              <a:t>einem</a:t>
-            </a:r>
-            <a:r>
-              <a:rPr lang="en-US" dirty="0"/>
-              <a:t> Python-Package </a:t>
-            </a:r>
-            <a:r>
-              <a:rPr lang="en-US" dirty="0" err="1"/>
-              <a:t>gebündelter</a:t>
-            </a:r>
-            <a:r>
-              <a:rPr lang="en-US" dirty="0"/>
-              <a:t> Code</a:t>
-            </a:r>
-          </a:p>
-          <a:p>
-            <a:pPr lvl="1">
-              <a:buSzPct val="45000"/>
-              <a:buFont typeface="StarSymbol"/>
-              <a:buChar char="●"/>
-            </a:pPr>
-            <a:r>
-              <a:rPr lang="en-US" dirty="0"/>
-              <a:t>MIT License (</a:t>
-            </a:r>
-            <a:r>
-              <a:rPr lang="en-US" dirty="0" err="1"/>
-              <a:t>Erhaltung</a:t>
-            </a:r>
-            <a:r>
-              <a:rPr lang="en-US" dirty="0"/>
-              <a:t> von </a:t>
-            </a:r>
-            <a:r>
-              <a:rPr lang="en-US" dirty="0" err="1"/>
-              <a:t>Urheberrechts</a:t>
-            </a:r>
-            <a:r>
-              <a:rPr lang="en-US" dirty="0"/>
-              <a:t>- und </a:t>
-            </a:r>
-            <a:r>
-              <a:rPr lang="en-US" dirty="0" err="1"/>
-              <a:t>Lizenzvermerken</a:t>
-            </a:r>
-            <a:r>
-              <a:rPr lang="en-US" dirty="0"/>
-              <a:t>)</a:t>
-            </a:r>
-          </a:p>
-          <a:p>
-            <a:pPr lvl="1">
-              <a:buSzPct val="45000"/>
-              <a:buFont typeface="StarSymbol"/>
-              <a:buChar char="●"/>
-            </a:pPr>
-            <a:endParaRPr lang="en-US" dirty="0"/>
-          </a:p>
-        </p:txBody>
-      </p:sp>
-      <p:sp>
-        <p:nvSpPr>
           <p:cNvPr id="5" name="Textfeld 4">
             <a:extLst>
               <a:ext uri="{FF2B5EF4-FFF2-40B4-BE49-F238E27FC236}">
@@ -7535,196 +7498,6 @@
             </a:pPr>
             <a:fld id="{91CD7B40-FCA9-49D6-9B53-7164D24F73CB}" type="slidenum">
               <a:t>6</a:t>
-            </a:fld>
-            <a:endParaRPr lang="en-US" sz="900" b="0" i="0" u="none" strike="noStrike" kern="1200" cap="none">
-              <a:ln>
-                <a:noFill/>
-              </a:ln>
-              <a:latin typeface="Liberation Sans" pitchFamily="18"/>
-              <a:ea typeface="Noto Sans CJK SC" pitchFamily="2"/>
-              <a:cs typeface="Noto Sans Devanagari" pitchFamily="2"/>
-            </a:endParaRPr>
-          </a:p>
-        </p:txBody>
-      </p:sp>
-      <p:sp>
-        <p:nvSpPr>
-          <p:cNvPr id="10" name="Fußzeilenplatzhalter 9">
-            <a:extLst>
-              <a:ext uri="{FF2B5EF4-FFF2-40B4-BE49-F238E27FC236}">
-                <a16:creationId xmlns:a16="http://schemas.microsoft.com/office/drawing/2014/main" id="{18500E83-202F-175B-FFC5-5DB0F295C0DA}"/>
-              </a:ext>
-            </a:extLst>
-          </p:cNvPr>
-          <p:cNvSpPr>
-            <a:spLocks noGrp="1"/>
-          </p:cNvSpPr>
-          <p:nvPr>
-            <p:ph type="ftr" sz="quarter" idx="11"/>
-          </p:nvPr>
-        </p:nvSpPr>
-        <p:spPr/>
-        <p:txBody>
-          <a:bodyPr/>
-          <a:lstStyle/>
-          <a:p>
-            <a:pPr lvl="0"/>
-            <a:r>
-              <a:rPr lang="en-US" dirty="0"/>
-              <a:t>Quelle: 1, 2</a:t>
-            </a:r>
-          </a:p>
-        </p:txBody>
-      </p:sp>
-    </p:spTree>
-    <p:extLst>
-      <p:ext uri="{BB962C8B-B14F-4D97-AF65-F5344CB8AC3E}">
-        <p14:creationId xmlns:p14="http://schemas.microsoft.com/office/powerpoint/2010/main" val="3729865801"/>
-      </p:ext>
-    </p:extLst>
-  </p:cSld>
-  <p:clrMapOvr>
-    <a:masterClrMapping/>
-  </p:clrMapOvr>
-</p:sld>
-</file>
-
-<file path=ppt/slides/slide7.xml><?xml version="1.0" encoding="utf-8"?>
-<p:sld xmlns:a="http://schemas.openxmlformats.org/drawingml/2006/main" xmlns:r="http://schemas.openxmlformats.org/officeDocument/2006/relationships" xmlns:p="http://schemas.openxmlformats.org/presentationml/2006/main">
-  <p:cSld>
-    <p:spTree>
-      <p:nvGrpSpPr>
-        <p:cNvPr id="1" name=""/>
-        <p:cNvGrpSpPr/>
-        <p:nvPr/>
-      </p:nvGrpSpPr>
-      <p:grpSpPr>
-        <a:xfrm>
-          <a:off x="0" y="0"/>
-          <a:ext cx="0" cy="0"/>
-          <a:chOff x="0" y="0"/>
-          <a:chExt cx="0" cy="0"/>
-        </a:xfrm>
-      </p:grpSpPr>
-      <p:pic>
-        <p:nvPicPr>
-          <p:cNvPr id="2" name="">
-            <a:extLst>
-              <a:ext uri="{FF2B5EF4-FFF2-40B4-BE49-F238E27FC236}">
-                <a16:creationId xmlns:a16="http://schemas.microsoft.com/office/drawing/2014/main" id="{8CBD471B-197A-9CA6-6800-C59C2AB503EB}"/>
-              </a:ext>
-            </a:extLst>
-          </p:cNvPr>
-          <p:cNvPicPr>
-            <a:picLocks noChangeAspect="1"/>
-          </p:cNvPicPr>
-          <p:nvPr/>
-        </p:nvPicPr>
-        <p:blipFill>
-          <a:blip r:embed="rId3">
-            <a:lum/>
-            <a:alphaModFix amt="10000"/>
-          </a:blip>
-          <a:srcRect/>
-          <a:stretch>
-            <a:fillRect/>
-          </a:stretch>
-        </p:blipFill>
-        <p:spPr>
-          <a:xfrm>
-            <a:off x="-20880" y="0"/>
-            <a:ext cx="10079280" cy="5669640"/>
-          </a:xfrm>
-          <a:prstGeom prst="rect">
-            <a:avLst/>
-          </a:prstGeom>
-          <a:noFill/>
-          <a:ln>
-            <a:noFill/>
-          </a:ln>
-        </p:spPr>
-      </p:pic>
-      <p:sp>
-        <p:nvSpPr>
-          <p:cNvPr id="3" name="Titel 2">
-            <a:extLst>
-              <a:ext uri="{FF2B5EF4-FFF2-40B4-BE49-F238E27FC236}">
-                <a16:creationId xmlns:a16="http://schemas.microsoft.com/office/drawing/2014/main" id="{5F129FD0-72FC-E004-53A8-F9619362310F}"/>
-              </a:ext>
-            </a:extLst>
-          </p:cNvPr>
-          <p:cNvSpPr txBox="1">
-            <a:spLocks noGrp="1"/>
-          </p:cNvSpPr>
-          <p:nvPr>
-            <p:ph type="title" idx="4294967295"/>
-          </p:nvPr>
-        </p:nvSpPr>
-        <p:spPr>
-          <a:xfrm>
-            <a:off x="503999" y="273240"/>
-            <a:ext cx="9071640" cy="946440"/>
-          </a:xfrm>
-        </p:spPr>
-        <p:txBody>
-          <a:bodyPr vert="horz"/>
-          <a:lstStyle/>
-          <a:p>
-            <a:pPr lvl="0"/>
-            <a:r>
-              <a:rPr lang="en-US" dirty="0" err="1"/>
-              <a:t>Sentimentanalyse</a:t>
-            </a:r>
-            <a:endParaRPr lang="en-US" dirty="0"/>
-          </a:p>
-        </p:txBody>
-      </p:sp>
-      <p:sp>
-        <p:nvSpPr>
-          <p:cNvPr id="5" name="Textfeld 4">
-            <a:extLst>
-              <a:ext uri="{FF2B5EF4-FFF2-40B4-BE49-F238E27FC236}">
-                <a16:creationId xmlns:a16="http://schemas.microsoft.com/office/drawing/2014/main" id="{9D7303CD-763D-2A38-08C3-DB08FCC19A37}"/>
-              </a:ext>
-            </a:extLst>
-          </p:cNvPr>
-          <p:cNvSpPr txBox="1"/>
-          <p:nvPr/>
-        </p:nvSpPr>
-        <p:spPr>
-          <a:xfrm>
-            <a:off x="9372600" y="5243040"/>
-            <a:ext cx="3832559" cy="427320"/>
-          </a:xfrm>
-          <a:prstGeom prst="rect">
-            <a:avLst/>
-          </a:prstGeom>
-          <a:noFill/>
-          <a:ln>
-            <a:noFill/>
-          </a:ln>
-        </p:spPr>
-        <p:txBody>
-          <a:bodyPr vert="horz" wrap="none" lIns="90000" tIns="45000" rIns="90000" bIns="45000" anchorCtr="0" compatLnSpc="0">
-            <a:spAutoFit/>
-          </a:bodyPr>
-          <a:lstStyle/>
-          <a:p>
-            <a:pPr marL="0" marR="0" lvl="0" indent="0" rtl="0" hangingPunct="0">
-              <a:lnSpc>
-                <a:spcPct val="100000"/>
-              </a:lnSpc>
-              <a:spcBef>
-                <a:spcPts val="0"/>
-              </a:spcBef>
-              <a:spcAft>
-                <a:spcPts val="0"/>
-              </a:spcAft>
-              <a:buNone/>
-              <a:tabLst/>
-            </a:pPr>
-            <a:fld id="{91CD7B40-FCA9-49D6-9B53-7164D24F73CB}" type="slidenum">
-              <a:t>7</a:t>
             </a:fld>
             <a:endParaRPr lang="en-US" sz="900" b="0" i="0" u="none" strike="noStrike" kern="1200" cap="none">
               <a:ln>
@@ -7853,7 +7626,7 @@
 </p:sld>
 </file>
 
-<file path=ppt/slides/slide8.xml><?xml version="1.0" encoding="utf-8"?>
+<file path=ppt/slides/slide7.xml><?xml version="1.0" encoding="utf-8"?>
 <p:sld xmlns:a="http://schemas.openxmlformats.org/drawingml/2006/main" xmlns:r="http://schemas.openxmlformats.org/officeDocument/2006/relationships" xmlns:p="http://schemas.openxmlformats.org/presentationml/2006/main">
   <p:cSld>
     <p:spTree>
@@ -7872,7 +7645,7 @@
       </p:grpSpPr>
       <p:pic>
         <p:nvPicPr>
-          <p:cNvPr id="2" name="">
+          <p:cNvPr id="2" name="Grafik 1">
             <a:extLst>
               <a:ext uri="{FF2B5EF4-FFF2-40B4-BE49-F238E27FC236}">
                 <a16:creationId xmlns:a16="http://schemas.microsoft.com/office/drawing/2014/main" id="{8CBD471B-197A-9CA6-6800-C59C2AB503EB}"/>
@@ -7988,7 +7761,7 @@
               <a:tabLst/>
             </a:pPr>
             <a:fld id="{91CD7B40-FCA9-49D6-9B53-7164D24F73CB}" type="slidenum">
-              <a:t>8</a:t>
+              <a:t>7</a:t>
             </a:fld>
             <a:endParaRPr lang="en-US" sz="900" b="0" i="0" u="none" strike="noStrike" kern="1200" cap="none">
               <a:ln>
@@ -8087,7 +7860,7 @@
 </p:sld>
 </file>
 
-<file path=ppt/slides/slide9.xml><?xml version="1.0" encoding="utf-8"?>
+<file path=ppt/slides/slide8.xml><?xml version="1.0" encoding="utf-8"?>
 <p:sld xmlns:a="http://schemas.openxmlformats.org/drawingml/2006/main" xmlns:r="http://schemas.openxmlformats.org/officeDocument/2006/relationships" xmlns:p="http://schemas.openxmlformats.org/presentationml/2006/main">
   <p:cSld>
     <p:spTree>
@@ -8106,7 +7879,7 @@
       </p:grpSpPr>
       <p:pic>
         <p:nvPicPr>
-          <p:cNvPr id="2" name="">
+          <p:cNvPr id="2" name="Grafik 1">
             <a:extLst>
               <a:ext uri="{FF2B5EF4-FFF2-40B4-BE49-F238E27FC236}">
                 <a16:creationId xmlns:a16="http://schemas.microsoft.com/office/drawing/2014/main" id="{8CBD471B-197A-9CA6-6800-C59C2AB503EB}"/>
@@ -8221,7 +7994,7 @@
               <a:tabLst/>
             </a:pPr>
             <a:fld id="{91CD7B40-FCA9-49D6-9B53-7164D24F73CB}" type="slidenum">
-              <a:t>9</a:t>
+              <a:t>8</a:t>
             </a:fld>
             <a:endParaRPr lang="en-US" sz="900" b="0" i="0" u="none" strike="noStrike" kern="1200" cap="none">
               <a:ln>
@@ -8602,6 +8375,249 @@
     <p:extLst>
       <p:ext uri="{BB962C8B-B14F-4D97-AF65-F5344CB8AC3E}">
         <p14:creationId xmlns:p14="http://schemas.microsoft.com/office/powerpoint/2010/main" val="916851198"/>
+      </p:ext>
+    </p:extLst>
+  </p:cSld>
+  <p:clrMapOvr>
+    <a:masterClrMapping/>
+  </p:clrMapOvr>
+</p:sld>
+</file>
+
+<file path=ppt/slides/slide9.xml><?xml version="1.0" encoding="utf-8"?>
+<p:sld xmlns:a="http://schemas.openxmlformats.org/drawingml/2006/main" xmlns:r="http://schemas.openxmlformats.org/officeDocument/2006/relationships" xmlns:p="http://schemas.openxmlformats.org/presentationml/2006/main">
+  <p:cSld>
+    <p:spTree>
+      <p:nvGrpSpPr>
+        <p:cNvPr id="1" name=""/>
+        <p:cNvGrpSpPr/>
+        <p:nvPr/>
+      </p:nvGrpSpPr>
+      <p:grpSpPr>
+        <a:xfrm>
+          <a:off x="0" y="0"/>
+          <a:ext cx="0" cy="0"/>
+          <a:chOff x="0" y="0"/>
+          <a:chExt cx="0" cy="0"/>
+        </a:xfrm>
+      </p:grpSpPr>
+      <p:pic>
+        <p:nvPicPr>
+          <p:cNvPr id="2" name="Grafik 1">
+            <a:extLst>
+              <a:ext uri="{FF2B5EF4-FFF2-40B4-BE49-F238E27FC236}">
+                <a16:creationId xmlns:a16="http://schemas.microsoft.com/office/drawing/2014/main" id="{8CBD471B-197A-9CA6-6800-C59C2AB503EB}"/>
+              </a:ext>
+            </a:extLst>
+          </p:cNvPr>
+          <p:cNvPicPr>
+            <a:picLocks noChangeAspect="1"/>
+          </p:cNvPicPr>
+          <p:nvPr/>
+        </p:nvPicPr>
+        <p:blipFill>
+          <a:blip r:embed="rId3">
+            <a:lum/>
+            <a:alphaModFix amt="10000"/>
+          </a:blip>
+          <a:srcRect/>
+          <a:stretch>
+            <a:fillRect/>
+          </a:stretch>
+        </p:blipFill>
+        <p:spPr>
+          <a:xfrm>
+            <a:off x="-20880" y="0"/>
+            <a:ext cx="10079280" cy="5669640"/>
+          </a:xfrm>
+          <a:prstGeom prst="rect">
+            <a:avLst/>
+          </a:prstGeom>
+          <a:noFill/>
+          <a:ln>
+            <a:noFill/>
+          </a:ln>
+        </p:spPr>
+      </p:pic>
+      <p:sp>
+        <p:nvSpPr>
+          <p:cNvPr id="3" name="Titel 2">
+            <a:extLst>
+              <a:ext uri="{FF2B5EF4-FFF2-40B4-BE49-F238E27FC236}">
+                <a16:creationId xmlns:a16="http://schemas.microsoft.com/office/drawing/2014/main" id="{5F129FD0-72FC-E004-53A8-F9619362310F}"/>
+              </a:ext>
+            </a:extLst>
+          </p:cNvPr>
+          <p:cNvSpPr txBox="1">
+            <a:spLocks noGrp="1"/>
+          </p:cNvSpPr>
+          <p:nvPr>
+            <p:ph type="title" idx="4294967295"/>
+          </p:nvPr>
+        </p:nvSpPr>
+        <p:spPr>
+          <a:xfrm>
+            <a:off x="503999" y="273240"/>
+            <a:ext cx="9071640" cy="946440"/>
+          </a:xfrm>
+        </p:spPr>
+        <p:txBody>
+          <a:bodyPr vert="horz"/>
+          <a:lstStyle/>
+          <a:p>
+            <a:pPr lvl="0"/>
+            <a:r>
+              <a:rPr lang="en-US" dirty="0" err="1"/>
+              <a:t>Sentimentanalyse</a:t>
+            </a:r>
+            <a:endParaRPr lang="en-US" dirty="0"/>
+          </a:p>
+        </p:txBody>
+      </p:sp>
+      <p:sp>
+        <p:nvSpPr>
+          <p:cNvPr id="4" name="Textplatzhalter 3">
+            <a:extLst>
+              <a:ext uri="{FF2B5EF4-FFF2-40B4-BE49-F238E27FC236}">
+                <a16:creationId xmlns:a16="http://schemas.microsoft.com/office/drawing/2014/main" id="{BE7B3F62-582B-123D-2ECE-29BF697C0566}"/>
+              </a:ext>
+            </a:extLst>
+          </p:cNvPr>
+          <p:cNvSpPr txBox="1">
+            <a:spLocks noGrp="1"/>
+          </p:cNvSpPr>
+          <p:nvPr>
+            <p:ph type="body" idx="4294967295"/>
+          </p:nvPr>
+        </p:nvSpPr>
+        <p:spPr>
+          <a:xfrm>
+            <a:off x="503998" y="1326600"/>
+            <a:ext cx="9554401" cy="3288239"/>
+          </a:xfrm>
+        </p:spPr>
+        <p:txBody>
+          <a:bodyPr vert="horz"/>
+          <a:lstStyle/>
+          <a:p>
+            <a:pPr lvl="1">
+              <a:buSzPct val="45000"/>
+              <a:buFont typeface="StarSymbol"/>
+              <a:buChar char="●"/>
+            </a:pPr>
+            <a:endParaRPr lang="en-US" dirty="0"/>
+          </a:p>
+        </p:txBody>
+      </p:sp>
+      <p:sp>
+        <p:nvSpPr>
+          <p:cNvPr id="5" name="Textfeld 4">
+            <a:extLst>
+              <a:ext uri="{FF2B5EF4-FFF2-40B4-BE49-F238E27FC236}">
+                <a16:creationId xmlns:a16="http://schemas.microsoft.com/office/drawing/2014/main" id="{9D7303CD-763D-2A38-08C3-DB08FCC19A37}"/>
+              </a:ext>
+            </a:extLst>
+          </p:cNvPr>
+          <p:cNvSpPr txBox="1"/>
+          <p:nvPr/>
+        </p:nvSpPr>
+        <p:spPr>
+          <a:xfrm>
+            <a:off x="9372600" y="5243040"/>
+            <a:ext cx="3832559" cy="427320"/>
+          </a:xfrm>
+          <a:prstGeom prst="rect">
+            <a:avLst/>
+          </a:prstGeom>
+          <a:noFill/>
+          <a:ln>
+            <a:noFill/>
+          </a:ln>
+        </p:spPr>
+        <p:txBody>
+          <a:bodyPr vert="horz" wrap="none" lIns="90000" tIns="45000" rIns="90000" bIns="45000" anchorCtr="0" compatLnSpc="0">
+            <a:spAutoFit/>
+          </a:bodyPr>
+          <a:lstStyle/>
+          <a:p>
+            <a:pPr marL="0" marR="0" lvl="0" indent="0" rtl="0" hangingPunct="0">
+              <a:lnSpc>
+                <a:spcPct val="100000"/>
+              </a:lnSpc>
+              <a:spcBef>
+                <a:spcPts val="0"/>
+              </a:spcBef>
+              <a:spcAft>
+                <a:spcPts val="0"/>
+              </a:spcAft>
+              <a:buNone/>
+              <a:tabLst/>
+            </a:pPr>
+            <a:fld id="{91CD7B40-FCA9-49D6-9B53-7164D24F73CB}" type="slidenum">
+              <a:t>9</a:t>
+            </a:fld>
+            <a:endParaRPr lang="en-US" sz="900" b="0" i="0" u="none" strike="noStrike" kern="1200" cap="none">
+              <a:ln>
+                <a:noFill/>
+              </a:ln>
+              <a:latin typeface="Liberation Sans" pitchFamily="18"/>
+              <a:ea typeface="Noto Sans CJK SC" pitchFamily="2"/>
+              <a:cs typeface="Noto Sans Devanagari" pitchFamily="2"/>
+            </a:endParaRPr>
+          </a:p>
+        </p:txBody>
+      </p:sp>
+      <p:pic>
+        <p:nvPicPr>
+          <p:cNvPr id="7" name="Picture 4">
+            <a:extLst>
+              <a:ext uri="{FF2B5EF4-FFF2-40B4-BE49-F238E27FC236}">
+                <a16:creationId xmlns:a16="http://schemas.microsoft.com/office/drawing/2014/main" id="{98158778-783C-D6D4-F6CC-64475DCEF603}"/>
+              </a:ext>
+            </a:extLst>
+          </p:cNvPr>
+          <p:cNvPicPr>
+            <a:picLocks noChangeAspect="1" noChangeArrowheads="1"/>
+          </p:cNvPicPr>
+          <p:nvPr/>
+        </p:nvPicPr>
+        <p:blipFill>
+          <a:blip r:embed="rId4">
+            <a:extLst>
+              <a:ext uri="{28A0092B-C50C-407E-A947-70E740481C1C}">
+                <a14:useLocalDpi xmlns:a14="http://schemas.microsoft.com/office/drawing/2010/main" val="0"/>
+              </a:ext>
+            </a:extLst>
+          </a:blip>
+          <a:srcRect/>
+          <a:stretch>
+            <a:fillRect/>
+          </a:stretch>
+        </p:blipFill>
+        <p:spPr bwMode="auto">
+          <a:xfrm>
+            <a:off x="5716723" y="2503767"/>
+            <a:ext cx="3117440" cy="1616782"/>
+          </a:xfrm>
+          <a:prstGeom prst="rect">
+            <a:avLst/>
+          </a:prstGeom>
+          <a:noFill/>
+          <a:extLst>
+            <a:ext uri="{909E8E84-426E-40DD-AFC4-6F175D3DCCD1}">
+              <a14:hiddenFill xmlns:a14="http://schemas.microsoft.com/office/drawing/2010/main">
+                <a:solidFill>
+                  <a:srgbClr val="FFFFFF"/>
+                </a:solidFill>
+              </a14:hiddenFill>
+            </a:ext>
+          </a:extLst>
+        </p:spPr>
+      </p:pic>
+    </p:spTree>
+    <p:extLst>
+      <p:ext uri="{BB962C8B-B14F-4D97-AF65-F5344CB8AC3E}">
+        <p14:creationId xmlns:p14="http://schemas.microsoft.com/office/powerpoint/2010/main" val="3469260252"/>
       </p:ext>
     </p:extLst>
   </p:cSld>

</xml_diff>